<commit_message>
created separate project that is the jersey rest api for the app. one route get all... plan and do the rest now
</commit_message>
<xml_diff>
--- a/ShimataCRepo.P0.Presentation.pptx
+++ b/ShimataCRepo.P0.Presentation.pptx
@@ -11877,7 +11877,7 @@
                 <a:cs typeface="Arial"/>
                 <a:sym typeface="Arial"/>
               </a:rPr>
-              <a:t>App Features List</a:t>
+              <a:t>P0 App Features List</a:t>
             </a:r>
             <a:endParaRPr sz="3700">
               <a:solidFill>
@@ -11924,8 +11924,8 @@
         </p:nvSpPr>
         <p:spPr>
           <a:xfrm>
-            <a:off x="1725975" y="787500"/>
-            <a:ext cx="3064800" cy="4266000"/>
+            <a:off x="1314375" y="787500"/>
+            <a:ext cx="3476400" cy="4266000"/>
           </a:xfrm>
           <a:prstGeom prst="rect">
             <a:avLst/>
@@ -11965,6 +11965,30 @@
                 <a:sym typeface="Arial"/>
               </a:rPr>
               <a:t>Login </a:t>
+            </a:r>
+            <a:r>
+              <a:rPr lang="en" sz="2100">
+                <a:solidFill>
+                  <a:srgbClr val="FFFFFF"/>
+                </a:solidFill>
+                <a:latin typeface="Arial"/>
+                <a:ea typeface="Arial"/>
+                <a:cs typeface="Arial"/>
+                <a:sym typeface="Arial"/>
+              </a:rPr>
+              <a:t>(</a:t>
+            </a:r>
+            <a:r>
+              <a:rPr lang="en" sz="2100">
+                <a:solidFill>
+                  <a:srgbClr val="FFFFFF"/>
+                </a:solidFill>
+                <a:latin typeface="Arial"/>
+                <a:ea typeface="Arial"/>
+                <a:cs typeface="Arial"/>
+                <a:sym typeface="Arial"/>
+              </a:rPr>
+              <a:t>validation)</a:t>
             </a:r>
             <a:endParaRPr sz="2100">
               <a:solidFill>
@@ -12027,6 +12051,40 @@
               <a:spcAft>
                 <a:spcPts val="0"/>
               </a:spcAft>
+              <a:buSzPts val="2100"/>
+              <a:buFont typeface="Arial"/>
+              <a:buChar char="○"/>
+            </a:pPr>
+            <a:r>
+              <a:rPr lang="en" sz="2100">
+                <a:latin typeface="Arial"/>
+                <a:ea typeface="Arial"/>
+                <a:cs typeface="Arial"/>
+                <a:sym typeface="Arial"/>
+              </a:rPr>
+              <a:t>Delete Event </a:t>
+            </a:r>
+            <a:endParaRPr sz="2100">
+              <a:solidFill>
+                <a:srgbClr val="FFFFFF"/>
+              </a:solidFill>
+              <a:latin typeface="Arial"/>
+              <a:ea typeface="Arial"/>
+              <a:cs typeface="Arial"/>
+              <a:sym typeface="Arial"/>
+            </a:endParaRPr>
+          </a:p>
+          <a:p>
+            <a:pPr indent="-361950" lvl="1" marL="914400" rtl="0" algn="l">
+              <a:lnSpc>
+                <a:spcPct val="150000"/>
+              </a:lnSpc>
+              <a:spcBef>
+                <a:spcPts val="0"/>
+              </a:spcBef>
+              <a:spcAft>
+                <a:spcPts val="0"/>
+              </a:spcAft>
               <a:buClr>
                 <a:srgbClr val="FFFFFF"/>
               </a:buClr>
@@ -12044,7 +12102,47 @@
                 <a:cs typeface="Arial"/>
                 <a:sym typeface="Arial"/>
               </a:rPr>
-              <a:t>Delete Event </a:t>
+              <a:t>View Event</a:t>
+            </a:r>
+            <a:endParaRPr sz="2100">
+              <a:solidFill>
+                <a:srgbClr val="FFFFFF"/>
+              </a:solidFill>
+              <a:latin typeface="Arial"/>
+              <a:ea typeface="Arial"/>
+              <a:cs typeface="Arial"/>
+              <a:sym typeface="Arial"/>
+            </a:endParaRPr>
+          </a:p>
+          <a:p>
+            <a:pPr indent="-361950" lvl="1" marL="914400" rtl="0" algn="l">
+              <a:lnSpc>
+                <a:spcPct val="150000"/>
+              </a:lnSpc>
+              <a:spcBef>
+                <a:spcPts val="0"/>
+              </a:spcBef>
+              <a:spcAft>
+                <a:spcPts val="0"/>
+              </a:spcAft>
+              <a:buClr>
+                <a:srgbClr val="FFFFFF"/>
+              </a:buClr>
+              <a:buSzPts val="2100"/>
+              <a:buFont typeface="Arial"/>
+              <a:buChar char="○"/>
+            </a:pPr>
+            <a:r>
+              <a:rPr lang="en" sz="2100">
+                <a:solidFill>
+                  <a:srgbClr val="FFFFFF"/>
+                </a:solidFill>
+                <a:latin typeface="Arial"/>
+                <a:ea typeface="Arial"/>
+                <a:cs typeface="Arial"/>
+                <a:sym typeface="Arial"/>
+              </a:rPr>
+              <a:t>Edit Event</a:t>
             </a:r>
             <a:endParaRPr sz="2100">
               <a:solidFill>
@@ -12268,7 +12366,7 @@
                 <a:cs typeface="Arial"/>
                 <a:sym typeface="Arial"/>
               </a:rPr>
-              <a:t>getEvents</a:t>
+              <a:t>login valid</a:t>
             </a:r>
             <a:endParaRPr sz="2100">
               <a:solidFill>
@@ -12308,47 +12406,7 @@
                 <a:cs typeface="Arial"/>
                 <a:sym typeface="Arial"/>
               </a:rPr>
-              <a:t>getEvent</a:t>
-            </a:r>
-            <a:endParaRPr sz="2100">
-              <a:solidFill>
-                <a:srgbClr val="FFFFFF"/>
-              </a:solidFill>
-              <a:latin typeface="Arial"/>
-              <a:ea typeface="Arial"/>
-              <a:cs typeface="Arial"/>
-              <a:sym typeface="Arial"/>
-            </a:endParaRPr>
-          </a:p>
-          <a:p>
-            <a:pPr indent="-361950" lvl="2" marL="1371600" rtl="0" algn="l">
-              <a:lnSpc>
-                <a:spcPct val="150000"/>
-              </a:lnSpc>
-              <a:spcBef>
-                <a:spcPts val="0"/>
-              </a:spcBef>
-              <a:spcAft>
-                <a:spcPts val="0"/>
-              </a:spcAft>
-              <a:buClr>
-                <a:srgbClr val="FFFFFF"/>
-              </a:buClr>
-              <a:buSzPts val="2100"/>
-              <a:buFont typeface="Arial"/>
-              <a:buChar char="■"/>
-            </a:pPr>
-            <a:r>
-              <a:rPr lang="en" sz="2100">
-                <a:solidFill>
-                  <a:srgbClr val="FFFFFF"/>
-                </a:solidFill>
-                <a:latin typeface="Arial"/>
-                <a:ea typeface="Arial"/>
-                <a:cs typeface="Arial"/>
-                <a:sym typeface="Arial"/>
-              </a:rPr>
-              <a:t>getUser</a:t>
+              <a:t>addEvent</a:t>
             </a:r>
             <a:endParaRPr sz="2100">
               <a:solidFill>

</xml_diff>